<commit_message>
Update Code and Presentation
</commit_message>
<xml_diff>
--- a/Presentation/WorkshopPresentation.pptx
+++ b/Presentation/WorkshopPresentation.pptx
@@ -146,7 +146,7 @@
           <p:cNvPr id="2" name="Title 1">
             <a:extLst>
               <a:ext uri="{FF2B5EF4-FFF2-40B4-BE49-F238E27FC236}">
-                <a16:creationId xmlns:a16="http://schemas.microsoft.com/office/drawing/2014/main" xmlns="" id="{23D5BA5D-E133-424F-B9C9-D0049B4C0136}"/>
+                <a16:creationId xmlns:a16="http://schemas.microsoft.com/office/drawing/2014/main" id="{23D5BA5D-E133-424F-B9C9-D0049B4C0136}"/>
               </a:ext>
             </a:extLst>
           </p:cNvPr>
@@ -183,7 +183,7 @@
           <p:cNvPr id="3" name="Subtitle 2">
             <a:extLst>
               <a:ext uri="{FF2B5EF4-FFF2-40B4-BE49-F238E27FC236}">
-                <a16:creationId xmlns:a16="http://schemas.microsoft.com/office/drawing/2014/main" xmlns="" id="{D3D9A121-8713-4F86-B65F-C4B25CAA44B9}"/>
+                <a16:creationId xmlns:a16="http://schemas.microsoft.com/office/drawing/2014/main" id="{D3D9A121-8713-4F86-B65F-C4B25CAA44B9}"/>
               </a:ext>
             </a:extLst>
           </p:cNvPr>
@@ -253,7 +253,7 @@
           <p:cNvPr id="4" name="Date Placeholder 3">
             <a:extLst>
               <a:ext uri="{FF2B5EF4-FFF2-40B4-BE49-F238E27FC236}">
-                <a16:creationId xmlns:a16="http://schemas.microsoft.com/office/drawing/2014/main" xmlns="" id="{2CF4CE46-37A6-4A86-89AE-0E2B0BD6FDEB}"/>
+                <a16:creationId xmlns:a16="http://schemas.microsoft.com/office/drawing/2014/main" id="{2CF4CE46-37A6-4A86-89AE-0E2B0BD6FDEB}"/>
               </a:ext>
             </a:extLst>
           </p:cNvPr>
@@ -271,9 +271,9 @@
           <a:p>
             <a:fld id="{F8654557-4515-4B32-B4E2-B04B0C096466}" type="datetimeFigureOut">
               <a:rPr lang="en-US" smtClean="0"/>
-              <a:t>8/4/18</a:t>
+              <a:t>8/5/2018</a:t>
             </a:fld>
-            <a:endParaRPr lang="en-US"/>
+            <a:endParaRPr lang="en-US" dirty="0"/>
           </a:p>
         </p:txBody>
       </p:sp>
@@ -282,7 +282,7 @@
           <p:cNvPr id="5" name="Footer Placeholder 4">
             <a:extLst>
               <a:ext uri="{FF2B5EF4-FFF2-40B4-BE49-F238E27FC236}">
-                <a16:creationId xmlns:a16="http://schemas.microsoft.com/office/drawing/2014/main" xmlns="" id="{E2B2061E-925D-4F5E-91CA-99A629709556}"/>
+                <a16:creationId xmlns:a16="http://schemas.microsoft.com/office/drawing/2014/main" id="{E2B2061E-925D-4F5E-91CA-99A629709556}"/>
               </a:ext>
             </a:extLst>
           </p:cNvPr>
@@ -298,7 +298,7 @@
           <a:bodyPr/>
           <a:lstStyle/>
           <a:p>
-            <a:endParaRPr lang="en-US"/>
+            <a:endParaRPr lang="en-US" dirty="0"/>
           </a:p>
         </p:txBody>
       </p:sp>
@@ -307,7 +307,7 @@
           <p:cNvPr id="6" name="Slide Number Placeholder 5">
             <a:extLst>
               <a:ext uri="{FF2B5EF4-FFF2-40B4-BE49-F238E27FC236}">
-                <a16:creationId xmlns:a16="http://schemas.microsoft.com/office/drawing/2014/main" xmlns="" id="{EB933584-AD4F-46C3-A8DA-94C03FFBE3BB}"/>
+                <a16:creationId xmlns:a16="http://schemas.microsoft.com/office/drawing/2014/main" id="{EB933584-AD4F-46C3-A8DA-94C03FFBE3BB}"/>
               </a:ext>
             </a:extLst>
           </p:cNvPr>
@@ -327,7 +327,7 @@
               <a:rPr lang="en-US" smtClean="0"/>
               <a:t>‹#›</a:t>
             </a:fld>
-            <a:endParaRPr lang="en-US"/>
+            <a:endParaRPr lang="en-US" dirty="0"/>
           </a:p>
         </p:txBody>
       </p:sp>
@@ -366,7 +366,7 @@
           <p:cNvPr id="2" name="Title 1">
             <a:extLst>
               <a:ext uri="{FF2B5EF4-FFF2-40B4-BE49-F238E27FC236}">
-                <a16:creationId xmlns:a16="http://schemas.microsoft.com/office/drawing/2014/main" xmlns="" id="{111D7B09-BD82-4383-9BFD-9E115E7CAD6D}"/>
+                <a16:creationId xmlns:a16="http://schemas.microsoft.com/office/drawing/2014/main" id="{111D7B09-BD82-4383-9BFD-9E115E7CAD6D}"/>
               </a:ext>
             </a:extLst>
           </p:cNvPr>
@@ -394,7 +394,7 @@
           <p:cNvPr id="3" name="Vertical Text Placeholder 2">
             <a:extLst>
               <a:ext uri="{FF2B5EF4-FFF2-40B4-BE49-F238E27FC236}">
-                <a16:creationId xmlns:a16="http://schemas.microsoft.com/office/drawing/2014/main" xmlns="" id="{29C0F8B1-D529-4791-BF3C-8B0E8C92C539}"/>
+                <a16:creationId xmlns:a16="http://schemas.microsoft.com/office/drawing/2014/main" id="{29C0F8B1-D529-4791-BF3C-8B0E8C92C539}"/>
               </a:ext>
             </a:extLst>
           </p:cNvPr>
@@ -451,7 +451,7 @@
           <p:cNvPr id="4" name="Date Placeholder 3">
             <a:extLst>
               <a:ext uri="{FF2B5EF4-FFF2-40B4-BE49-F238E27FC236}">
-                <a16:creationId xmlns:a16="http://schemas.microsoft.com/office/drawing/2014/main" xmlns="" id="{9161EB92-EB66-4741-900C-58634623FB09}"/>
+                <a16:creationId xmlns:a16="http://schemas.microsoft.com/office/drawing/2014/main" id="{9161EB92-EB66-4741-900C-58634623FB09}"/>
               </a:ext>
             </a:extLst>
           </p:cNvPr>
@@ -469,9 +469,9 @@
           <a:p>
             <a:fld id="{F8654557-4515-4B32-B4E2-B04B0C096466}" type="datetimeFigureOut">
               <a:rPr lang="en-US" smtClean="0"/>
-              <a:t>8/4/18</a:t>
+              <a:t>8/5/2018</a:t>
             </a:fld>
-            <a:endParaRPr lang="en-US"/>
+            <a:endParaRPr lang="en-US" dirty="0"/>
           </a:p>
         </p:txBody>
       </p:sp>
@@ -480,7 +480,7 @@
           <p:cNvPr id="5" name="Footer Placeholder 4">
             <a:extLst>
               <a:ext uri="{FF2B5EF4-FFF2-40B4-BE49-F238E27FC236}">
-                <a16:creationId xmlns:a16="http://schemas.microsoft.com/office/drawing/2014/main" xmlns="" id="{CBAE72FA-3402-4A65-9E90-192076CED7CC}"/>
+                <a16:creationId xmlns:a16="http://schemas.microsoft.com/office/drawing/2014/main" id="{CBAE72FA-3402-4A65-9E90-192076CED7CC}"/>
               </a:ext>
             </a:extLst>
           </p:cNvPr>
@@ -496,7 +496,7 @@
           <a:bodyPr/>
           <a:lstStyle/>
           <a:p>
-            <a:endParaRPr lang="en-US"/>
+            <a:endParaRPr lang="en-US" dirty="0"/>
           </a:p>
         </p:txBody>
       </p:sp>
@@ -505,7 +505,7 @@
           <p:cNvPr id="6" name="Slide Number Placeholder 5">
             <a:extLst>
               <a:ext uri="{FF2B5EF4-FFF2-40B4-BE49-F238E27FC236}">
-                <a16:creationId xmlns:a16="http://schemas.microsoft.com/office/drawing/2014/main" xmlns="" id="{65FC5CAF-BF12-41B8-9BF4-CFDE5CFCBD95}"/>
+                <a16:creationId xmlns:a16="http://schemas.microsoft.com/office/drawing/2014/main" id="{65FC5CAF-BF12-41B8-9BF4-CFDE5CFCBD95}"/>
               </a:ext>
             </a:extLst>
           </p:cNvPr>
@@ -525,7 +525,7 @@
               <a:rPr lang="en-US" smtClean="0"/>
               <a:t>‹#›</a:t>
             </a:fld>
-            <a:endParaRPr lang="en-US"/>
+            <a:endParaRPr lang="en-US" dirty="0"/>
           </a:p>
         </p:txBody>
       </p:sp>
@@ -564,7 +564,7 @@
           <p:cNvPr id="2" name="Vertical Title 1">
             <a:extLst>
               <a:ext uri="{FF2B5EF4-FFF2-40B4-BE49-F238E27FC236}">
-                <a16:creationId xmlns:a16="http://schemas.microsoft.com/office/drawing/2014/main" xmlns="" id="{4878AB7F-CDC9-4F43-B415-8B06F9FD7EBD}"/>
+                <a16:creationId xmlns:a16="http://schemas.microsoft.com/office/drawing/2014/main" id="{4878AB7F-CDC9-4F43-B415-8B06F9FD7EBD}"/>
               </a:ext>
             </a:extLst>
           </p:cNvPr>
@@ -597,7 +597,7 @@
           <p:cNvPr id="3" name="Vertical Text Placeholder 2">
             <a:extLst>
               <a:ext uri="{FF2B5EF4-FFF2-40B4-BE49-F238E27FC236}">
-                <a16:creationId xmlns:a16="http://schemas.microsoft.com/office/drawing/2014/main" xmlns="" id="{2F6A8B55-7A38-4E9C-A8DD-D7C22FBC3597}"/>
+                <a16:creationId xmlns:a16="http://schemas.microsoft.com/office/drawing/2014/main" id="{2F6A8B55-7A38-4E9C-A8DD-D7C22FBC3597}"/>
               </a:ext>
             </a:extLst>
           </p:cNvPr>
@@ -659,7 +659,7 @@
           <p:cNvPr id="4" name="Date Placeholder 3">
             <a:extLst>
               <a:ext uri="{FF2B5EF4-FFF2-40B4-BE49-F238E27FC236}">
-                <a16:creationId xmlns:a16="http://schemas.microsoft.com/office/drawing/2014/main" xmlns="" id="{317921E2-569A-4B31-834F-2DDDFF6DEB98}"/>
+                <a16:creationId xmlns:a16="http://schemas.microsoft.com/office/drawing/2014/main" id="{317921E2-569A-4B31-834F-2DDDFF6DEB98}"/>
               </a:ext>
             </a:extLst>
           </p:cNvPr>
@@ -677,9 +677,9 @@
           <a:p>
             <a:fld id="{F8654557-4515-4B32-B4E2-B04B0C096466}" type="datetimeFigureOut">
               <a:rPr lang="en-US" smtClean="0"/>
-              <a:t>8/4/18</a:t>
+              <a:t>8/5/2018</a:t>
             </a:fld>
-            <a:endParaRPr lang="en-US"/>
+            <a:endParaRPr lang="en-US" dirty="0"/>
           </a:p>
         </p:txBody>
       </p:sp>
@@ -688,7 +688,7 @@
           <p:cNvPr id="5" name="Footer Placeholder 4">
             <a:extLst>
               <a:ext uri="{FF2B5EF4-FFF2-40B4-BE49-F238E27FC236}">
-                <a16:creationId xmlns:a16="http://schemas.microsoft.com/office/drawing/2014/main" xmlns="" id="{BAEEFEB1-966F-4388-9E1B-984E014A86D2}"/>
+                <a16:creationId xmlns:a16="http://schemas.microsoft.com/office/drawing/2014/main" id="{BAEEFEB1-966F-4388-9E1B-984E014A86D2}"/>
               </a:ext>
             </a:extLst>
           </p:cNvPr>
@@ -704,7 +704,7 @@
           <a:bodyPr/>
           <a:lstStyle/>
           <a:p>
-            <a:endParaRPr lang="en-US"/>
+            <a:endParaRPr lang="en-US" dirty="0"/>
           </a:p>
         </p:txBody>
       </p:sp>
@@ -713,7 +713,7 @@
           <p:cNvPr id="6" name="Slide Number Placeholder 5">
             <a:extLst>
               <a:ext uri="{FF2B5EF4-FFF2-40B4-BE49-F238E27FC236}">
-                <a16:creationId xmlns:a16="http://schemas.microsoft.com/office/drawing/2014/main" xmlns="" id="{76B67BCE-A9CE-4088-867C-32B5E1BE4604}"/>
+                <a16:creationId xmlns:a16="http://schemas.microsoft.com/office/drawing/2014/main" id="{76B67BCE-A9CE-4088-867C-32B5E1BE4604}"/>
               </a:ext>
             </a:extLst>
           </p:cNvPr>
@@ -733,7 +733,7 @@
               <a:rPr lang="en-US" smtClean="0"/>
               <a:t>‹#›</a:t>
             </a:fld>
-            <a:endParaRPr lang="en-US"/>
+            <a:endParaRPr lang="en-US" dirty="0"/>
           </a:p>
         </p:txBody>
       </p:sp>
@@ -772,7 +772,7 @@
           <p:cNvPr id="2" name="Title 1">
             <a:extLst>
               <a:ext uri="{FF2B5EF4-FFF2-40B4-BE49-F238E27FC236}">
-                <a16:creationId xmlns:a16="http://schemas.microsoft.com/office/drawing/2014/main" xmlns="" id="{D206BEB9-5150-4241-A835-0867B1AFA189}"/>
+                <a16:creationId xmlns:a16="http://schemas.microsoft.com/office/drawing/2014/main" id="{D206BEB9-5150-4241-A835-0867B1AFA189}"/>
               </a:ext>
             </a:extLst>
           </p:cNvPr>
@@ -800,7 +800,7 @@
           <p:cNvPr id="3" name="Content Placeholder 2">
             <a:extLst>
               <a:ext uri="{FF2B5EF4-FFF2-40B4-BE49-F238E27FC236}">
-                <a16:creationId xmlns:a16="http://schemas.microsoft.com/office/drawing/2014/main" xmlns="" id="{DAE68C46-075F-407E-BE68-CA2CF8ED7A50}"/>
+                <a16:creationId xmlns:a16="http://schemas.microsoft.com/office/drawing/2014/main" id="{DAE68C46-075F-407E-BE68-CA2CF8ED7A50}"/>
               </a:ext>
             </a:extLst>
           </p:cNvPr>
@@ -857,7 +857,7 @@
           <p:cNvPr id="4" name="Date Placeholder 3">
             <a:extLst>
               <a:ext uri="{FF2B5EF4-FFF2-40B4-BE49-F238E27FC236}">
-                <a16:creationId xmlns:a16="http://schemas.microsoft.com/office/drawing/2014/main" xmlns="" id="{D0094123-ECAB-46F5-9F9D-3B27C5C2514D}"/>
+                <a16:creationId xmlns:a16="http://schemas.microsoft.com/office/drawing/2014/main" id="{D0094123-ECAB-46F5-9F9D-3B27C5C2514D}"/>
               </a:ext>
             </a:extLst>
           </p:cNvPr>
@@ -875,9 +875,9 @@
           <a:p>
             <a:fld id="{F8654557-4515-4B32-B4E2-B04B0C096466}" type="datetimeFigureOut">
               <a:rPr lang="en-US" smtClean="0"/>
-              <a:t>8/4/18</a:t>
+              <a:t>8/5/2018</a:t>
             </a:fld>
-            <a:endParaRPr lang="en-US"/>
+            <a:endParaRPr lang="en-US" dirty="0"/>
           </a:p>
         </p:txBody>
       </p:sp>
@@ -886,7 +886,7 @@
           <p:cNvPr id="5" name="Footer Placeholder 4">
             <a:extLst>
               <a:ext uri="{FF2B5EF4-FFF2-40B4-BE49-F238E27FC236}">
-                <a16:creationId xmlns:a16="http://schemas.microsoft.com/office/drawing/2014/main" xmlns="" id="{321625F8-6D24-4908-9510-AC60E2E1E15E}"/>
+                <a16:creationId xmlns:a16="http://schemas.microsoft.com/office/drawing/2014/main" id="{321625F8-6D24-4908-9510-AC60E2E1E15E}"/>
               </a:ext>
             </a:extLst>
           </p:cNvPr>
@@ -902,7 +902,7 @@
           <a:bodyPr/>
           <a:lstStyle/>
           <a:p>
-            <a:endParaRPr lang="en-US"/>
+            <a:endParaRPr lang="en-US" dirty="0"/>
           </a:p>
         </p:txBody>
       </p:sp>
@@ -911,7 +911,7 @@
           <p:cNvPr id="6" name="Slide Number Placeholder 5">
             <a:extLst>
               <a:ext uri="{FF2B5EF4-FFF2-40B4-BE49-F238E27FC236}">
-                <a16:creationId xmlns:a16="http://schemas.microsoft.com/office/drawing/2014/main" xmlns="" id="{8E586CF1-6DC6-4F2B-906A-3C56BEDA471F}"/>
+                <a16:creationId xmlns:a16="http://schemas.microsoft.com/office/drawing/2014/main" id="{8E586CF1-6DC6-4F2B-906A-3C56BEDA471F}"/>
               </a:ext>
             </a:extLst>
           </p:cNvPr>
@@ -931,7 +931,7 @@
               <a:rPr lang="en-US" smtClean="0"/>
               <a:t>‹#›</a:t>
             </a:fld>
-            <a:endParaRPr lang="en-US"/>
+            <a:endParaRPr lang="en-US" dirty="0"/>
           </a:p>
         </p:txBody>
       </p:sp>
@@ -970,7 +970,7 @@
           <p:cNvPr id="2" name="Title 1">
             <a:extLst>
               <a:ext uri="{FF2B5EF4-FFF2-40B4-BE49-F238E27FC236}">
-                <a16:creationId xmlns:a16="http://schemas.microsoft.com/office/drawing/2014/main" xmlns="" id="{3099D0BC-8EEE-40BC-A606-224690D6F484}"/>
+                <a16:creationId xmlns:a16="http://schemas.microsoft.com/office/drawing/2014/main" id="{3099D0BC-8EEE-40BC-A606-224690D6F484}"/>
               </a:ext>
             </a:extLst>
           </p:cNvPr>
@@ -1007,7 +1007,7 @@
           <p:cNvPr id="3" name="Text Placeholder 2">
             <a:extLst>
               <a:ext uri="{FF2B5EF4-FFF2-40B4-BE49-F238E27FC236}">
-                <a16:creationId xmlns:a16="http://schemas.microsoft.com/office/drawing/2014/main" xmlns="" id="{70493FCB-D03C-49E5-B03B-918AC230B949}"/>
+                <a16:creationId xmlns:a16="http://schemas.microsoft.com/office/drawing/2014/main" id="{70493FCB-D03C-49E5-B03B-918AC230B949}"/>
               </a:ext>
             </a:extLst>
           </p:cNvPr>
@@ -1132,7 +1132,7 @@
           <p:cNvPr id="4" name="Date Placeholder 3">
             <a:extLst>
               <a:ext uri="{FF2B5EF4-FFF2-40B4-BE49-F238E27FC236}">
-                <a16:creationId xmlns:a16="http://schemas.microsoft.com/office/drawing/2014/main" xmlns="" id="{F684ECB6-A856-466E-8E4B-30CF91434C45}"/>
+                <a16:creationId xmlns:a16="http://schemas.microsoft.com/office/drawing/2014/main" id="{F684ECB6-A856-466E-8E4B-30CF91434C45}"/>
               </a:ext>
             </a:extLst>
           </p:cNvPr>
@@ -1150,9 +1150,9 @@
           <a:p>
             <a:fld id="{F8654557-4515-4B32-B4E2-B04B0C096466}" type="datetimeFigureOut">
               <a:rPr lang="en-US" smtClean="0"/>
-              <a:t>8/4/18</a:t>
+              <a:t>8/5/2018</a:t>
             </a:fld>
-            <a:endParaRPr lang="en-US"/>
+            <a:endParaRPr lang="en-US" dirty="0"/>
           </a:p>
         </p:txBody>
       </p:sp>
@@ -1161,7 +1161,7 @@
           <p:cNvPr id="5" name="Footer Placeholder 4">
             <a:extLst>
               <a:ext uri="{FF2B5EF4-FFF2-40B4-BE49-F238E27FC236}">
-                <a16:creationId xmlns:a16="http://schemas.microsoft.com/office/drawing/2014/main" xmlns="" id="{8E08FD08-815A-48B7-B4D9-8462EA76A436}"/>
+                <a16:creationId xmlns:a16="http://schemas.microsoft.com/office/drawing/2014/main" id="{8E08FD08-815A-48B7-B4D9-8462EA76A436}"/>
               </a:ext>
             </a:extLst>
           </p:cNvPr>
@@ -1177,7 +1177,7 @@
           <a:bodyPr/>
           <a:lstStyle/>
           <a:p>
-            <a:endParaRPr lang="en-US"/>
+            <a:endParaRPr lang="en-US" dirty="0"/>
           </a:p>
         </p:txBody>
       </p:sp>
@@ -1186,7 +1186,7 @@
           <p:cNvPr id="6" name="Slide Number Placeholder 5">
             <a:extLst>
               <a:ext uri="{FF2B5EF4-FFF2-40B4-BE49-F238E27FC236}">
-                <a16:creationId xmlns:a16="http://schemas.microsoft.com/office/drawing/2014/main" xmlns="" id="{42EAD59F-7032-492D-B4A6-34BFE257BEEF}"/>
+                <a16:creationId xmlns:a16="http://schemas.microsoft.com/office/drawing/2014/main" id="{42EAD59F-7032-492D-B4A6-34BFE257BEEF}"/>
               </a:ext>
             </a:extLst>
           </p:cNvPr>
@@ -1206,7 +1206,7 @@
               <a:rPr lang="en-US" smtClean="0"/>
               <a:t>‹#›</a:t>
             </a:fld>
-            <a:endParaRPr lang="en-US"/>
+            <a:endParaRPr lang="en-US" dirty="0"/>
           </a:p>
         </p:txBody>
       </p:sp>
@@ -1245,7 +1245,7 @@
           <p:cNvPr id="2" name="Title 1">
             <a:extLst>
               <a:ext uri="{FF2B5EF4-FFF2-40B4-BE49-F238E27FC236}">
-                <a16:creationId xmlns:a16="http://schemas.microsoft.com/office/drawing/2014/main" xmlns="" id="{BC218553-8290-4AE2-9705-B73966419164}"/>
+                <a16:creationId xmlns:a16="http://schemas.microsoft.com/office/drawing/2014/main" id="{BC218553-8290-4AE2-9705-B73966419164}"/>
               </a:ext>
             </a:extLst>
           </p:cNvPr>
@@ -1273,7 +1273,7 @@
           <p:cNvPr id="3" name="Content Placeholder 2">
             <a:extLst>
               <a:ext uri="{FF2B5EF4-FFF2-40B4-BE49-F238E27FC236}">
-                <a16:creationId xmlns:a16="http://schemas.microsoft.com/office/drawing/2014/main" xmlns="" id="{0C0E9347-0CB2-432E-921C-04330F27B66F}"/>
+                <a16:creationId xmlns:a16="http://schemas.microsoft.com/office/drawing/2014/main" id="{0C0E9347-0CB2-432E-921C-04330F27B66F}"/>
               </a:ext>
             </a:extLst>
           </p:cNvPr>
@@ -1335,7 +1335,7 @@
           <p:cNvPr id="4" name="Content Placeholder 3">
             <a:extLst>
               <a:ext uri="{FF2B5EF4-FFF2-40B4-BE49-F238E27FC236}">
-                <a16:creationId xmlns:a16="http://schemas.microsoft.com/office/drawing/2014/main" xmlns="" id="{9634DFCE-F071-4615-90DE-ED9C3FAC1119}"/>
+                <a16:creationId xmlns:a16="http://schemas.microsoft.com/office/drawing/2014/main" id="{9634DFCE-F071-4615-90DE-ED9C3FAC1119}"/>
               </a:ext>
             </a:extLst>
           </p:cNvPr>
@@ -1397,7 +1397,7 @@
           <p:cNvPr id="5" name="Date Placeholder 4">
             <a:extLst>
               <a:ext uri="{FF2B5EF4-FFF2-40B4-BE49-F238E27FC236}">
-                <a16:creationId xmlns:a16="http://schemas.microsoft.com/office/drawing/2014/main" xmlns="" id="{86F6D358-63BF-4763-B992-DAEF242D2E08}"/>
+                <a16:creationId xmlns:a16="http://schemas.microsoft.com/office/drawing/2014/main" id="{86F6D358-63BF-4763-B992-DAEF242D2E08}"/>
               </a:ext>
             </a:extLst>
           </p:cNvPr>
@@ -1415,9 +1415,9 @@
           <a:p>
             <a:fld id="{F8654557-4515-4B32-B4E2-B04B0C096466}" type="datetimeFigureOut">
               <a:rPr lang="en-US" smtClean="0"/>
-              <a:t>8/4/18</a:t>
+              <a:t>8/5/2018</a:t>
             </a:fld>
-            <a:endParaRPr lang="en-US"/>
+            <a:endParaRPr lang="en-US" dirty="0"/>
           </a:p>
         </p:txBody>
       </p:sp>
@@ -1426,7 +1426,7 @@
           <p:cNvPr id="6" name="Footer Placeholder 5">
             <a:extLst>
               <a:ext uri="{FF2B5EF4-FFF2-40B4-BE49-F238E27FC236}">
-                <a16:creationId xmlns:a16="http://schemas.microsoft.com/office/drawing/2014/main" xmlns="" id="{5E601C59-B76F-416A-9924-5712696DA7F1}"/>
+                <a16:creationId xmlns:a16="http://schemas.microsoft.com/office/drawing/2014/main" id="{5E601C59-B76F-416A-9924-5712696DA7F1}"/>
               </a:ext>
             </a:extLst>
           </p:cNvPr>
@@ -1442,7 +1442,7 @@
           <a:bodyPr/>
           <a:lstStyle/>
           <a:p>
-            <a:endParaRPr lang="en-US"/>
+            <a:endParaRPr lang="en-US" dirty="0"/>
           </a:p>
         </p:txBody>
       </p:sp>
@@ -1451,7 +1451,7 @@
           <p:cNvPr id="7" name="Slide Number Placeholder 6">
             <a:extLst>
               <a:ext uri="{FF2B5EF4-FFF2-40B4-BE49-F238E27FC236}">
-                <a16:creationId xmlns:a16="http://schemas.microsoft.com/office/drawing/2014/main" xmlns="" id="{D2564EE2-42F6-44D6-88C6-F9D37C38CA06}"/>
+                <a16:creationId xmlns:a16="http://schemas.microsoft.com/office/drawing/2014/main" id="{D2564EE2-42F6-44D6-88C6-F9D37C38CA06}"/>
               </a:ext>
             </a:extLst>
           </p:cNvPr>
@@ -1471,7 +1471,7 @@
               <a:rPr lang="en-US" smtClean="0"/>
               <a:t>‹#›</a:t>
             </a:fld>
-            <a:endParaRPr lang="en-US"/>
+            <a:endParaRPr lang="en-US" dirty="0"/>
           </a:p>
         </p:txBody>
       </p:sp>
@@ -1510,7 +1510,7 @@
           <p:cNvPr id="2" name="Title 1">
             <a:extLst>
               <a:ext uri="{FF2B5EF4-FFF2-40B4-BE49-F238E27FC236}">
-                <a16:creationId xmlns:a16="http://schemas.microsoft.com/office/drawing/2014/main" xmlns="" id="{91A1F9A6-27CA-4A3C-AE0B-7C2ECBB18016}"/>
+                <a16:creationId xmlns:a16="http://schemas.microsoft.com/office/drawing/2014/main" id="{91A1F9A6-27CA-4A3C-AE0B-7C2ECBB18016}"/>
               </a:ext>
             </a:extLst>
           </p:cNvPr>
@@ -1543,7 +1543,7 @@
           <p:cNvPr id="3" name="Text Placeholder 2">
             <a:extLst>
               <a:ext uri="{FF2B5EF4-FFF2-40B4-BE49-F238E27FC236}">
-                <a16:creationId xmlns:a16="http://schemas.microsoft.com/office/drawing/2014/main" xmlns="" id="{05316853-7352-4FD1-8724-B1E4E1CB7A74}"/>
+                <a16:creationId xmlns:a16="http://schemas.microsoft.com/office/drawing/2014/main" id="{05316853-7352-4FD1-8724-B1E4E1CB7A74}"/>
               </a:ext>
             </a:extLst>
           </p:cNvPr>
@@ -1614,7 +1614,7 @@
           <p:cNvPr id="4" name="Content Placeholder 3">
             <a:extLst>
               <a:ext uri="{FF2B5EF4-FFF2-40B4-BE49-F238E27FC236}">
-                <a16:creationId xmlns:a16="http://schemas.microsoft.com/office/drawing/2014/main" xmlns="" id="{0977B9F6-4593-4100-9E2E-04D8DF7C8C4B}"/>
+                <a16:creationId xmlns:a16="http://schemas.microsoft.com/office/drawing/2014/main" id="{0977B9F6-4593-4100-9E2E-04D8DF7C8C4B}"/>
               </a:ext>
             </a:extLst>
           </p:cNvPr>
@@ -1676,7 +1676,7 @@
           <p:cNvPr id="5" name="Text Placeholder 4">
             <a:extLst>
               <a:ext uri="{FF2B5EF4-FFF2-40B4-BE49-F238E27FC236}">
-                <a16:creationId xmlns:a16="http://schemas.microsoft.com/office/drawing/2014/main" xmlns="" id="{7E96635B-CFF1-4112-A472-658901C60752}"/>
+                <a16:creationId xmlns:a16="http://schemas.microsoft.com/office/drawing/2014/main" id="{7E96635B-CFF1-4112-A472-658901C60752}"/>
               </a:ext>
             </a:extLst>
           </p:cNvPr>
@@ -1747,7 +1747,7 @@
           <p:cNvPr id="6" name="Content Placeholder 5">
             <a:extLst>
               <a:ext uri="{FF2B5EF4-FFF2-40B4-BE49-F238E27FC236}">
-                <a16:creationId xmlns:a16="http://schemas.microsoft.com/office/drawing/2014/main" xmlns="" id="{446401DE-8F8F-4456-92FF-71FEF99EEBD9}"/>
+                <a16:creationId xmlns:a16="http://schemas.microsoft.com/office/drawing/2014/main" id="{446401DE-8F8F-4456-92FF-71FEF99EEBD9}"/>
               </a:ext>
             </a:extLst>
           </p:cNvPr>
@@ -1809,7 +1809,7 @@
           <p:cNvPr id="7" name="Date Placeholder 6">
             <a:extLst>
               <a:ext uri="{FF2B5EF4-FFF2-40B4-BE49-F238E27FC236}">
-                <a16:creationId xmlns:a16="http://schemas.microsoft.com/office/drawing/2014/main" xmlns="" id="{6F825A47-A49C-4B80-BF88-0E8E2CF9197D}"/>
+                <a16:creationId xmlns:a16="http://schemas.microsoft.com/office/drawing/2014/main" id="{6F825A47-A49C-4B80-BF88-0E8E2CF9197D}"/>
               </a:ext>
             </a:extLst>
           </p:cNvPr>
@@ -1827,9 +1827,9 @@
           <a:p>
             <a:fld id="{F8654557-4515-4B32-B4E2-B04B0C096466}" type="datetimeFigureOut">
               <a:rPr lang="en-US" smtClean="0"/>
-              <a:t>8/4/18</a:t>
+              <a:t>8/5/2018</a:t>
             </a:fld>
-            <a:endParaRPr lang="en-US"/>
+            <a:endParaRPr lang="en-US" dirty="0"/>
           </a:p>
         </p:txBody>
       </p:sp>
@@ -1838,7 +1838,7 @@
           <p:cNvPr id="8" name="Footer Placeholder 7">
             <a:extLst>
               <a:ext uri="{FF2B5EF4-FFF2-40B4-BE49-F238E27FC236}">
-                <a16:creationId xmlns:a16="http://schemas.microsoft.com/office/drawing/2014/main" xmlns="" id="{CFB3B6F9-F4B0-4BEB-9E9A-4F2D08C5F219}"/>
+                <a16:creationId xmlns:a16="http://schemas.microsoft.com/office/drawing/2014/main" id="{CFB3B6F9-F4B0-4BEB-9E9A-4F2D08C5F219}"/>
               </a:ext>
             </a:extLst>
           </p:cNvPr>
@@ -1854,7 +1854,7 @@
           <a:bodyPr/>
           <a:lstStyle/>
           <a:p>
-            <a:endParaRPr lang="en-US"/>
+            <a:endParaRPr lang="en-US" dirty="0"/>
           </a:p>
         </p:txBody>
       </p:sp>
@@ -1863,7 +1863,7 @@
           <p:cNvPr id="9" name="Slide Number Placeholder 8">
             <a:extLst>
               <a:ext uri="{FF2B5EF4-FFF2-40B4-BE49-F238E27FC236}">
-                <a16:creationId xmlns:a16="http://schemas.microsoft.com/office/drawing/2014/main" xmlns="" id="{3C71F959-1478-481B-BA00-C09DEDC29475}"/>
+                <a16:creationId xmlns:a16="http://schemas.microsoft.com/office/drawing/2014/main" id="{3C71F959-1478-481B-BA00-C09DEDC29475}"/>
               </a:ext>
             </a:extLst>
           </p:cNvPr>
@@ -1883,7 +1883,7 @@
               <a:rPr lang="en-US" smtClean="0"/>
               <a:t>‹#›</a:t>
             </a:fld>
-            <a:endParaRPr lang="en-US"/>
+            <a:endParaRPr lang="en-US" dirty="0"/>
           </a:p>
         </p:txBody>
       </p:sp>
@@ -1922,7 +1922,7 @@
           <p:cNvPr id="2" name="Title 1">
             <a:extLst>
               <a:ext uri="{FF2B5EF4-FFF2-40B4-BE49-F238E27FC236}">
-                <a16:creationId xmlns:a16="http://schemas.microsoft.com/office/drawing/2014/main" xmlns="" id="{04F90EAD-362A-464D-A339-1BE86496EF60}"/>
+                <a16:creationId xmlns:a16="http://schemas.microsoft.com/office/drawing/2014/main" id="{04F90EAD-362A-464D-A339-1BE86496EF60}"/>
               </a:ext>
             </a:extLst>
           </p:cNvPr>
@@ -1950,7 +1950,7 @@
           <p:cNvPr id="3" name="Date Placeholder 2">
             <a:extLst>
               <a:ext uri="{FF2B5EF4-FFF2-40B4-BE49-F238E27FC236}">
-                <a16:creationId xmlns:a16="http://schemas.microsoft.com/office/drawing/2014/main" xmlns="" id="{C984CBA2-EEB8-414B-A545-D990CC0BC90F}"/>
+                <a16:creationId xmlns:a16="http://schemas.microsoft.com/office/drawing/2014/main" id="{C984CBA2-EEB8-414B-A545-D990CC0BC90F}"/>
               </a:ext>
             </a:extLst>
           </p:cNvPr>
@@ -1968,9 +1968,9 @@
           <a:p>
             <a:fld id="{F8654557-4515-4B32-B4E2-B04B0C096466}" type="datetimeFigureOut">
               <a:rPr lang="en-US" smtClean="0"/>
-              <a:t>8/4/18</a:t>
+              <a:t>8/5/2018</a:t>
             </a:fld>
-            <a:endParaRPr lang="en-US"/>
+            <a:endParaRPr lang="en-US" dirty="0"/>
           </a:p>
         </p:txBody>
       </p:sp>
@@ -1979,7 +1979,7 @@
           <p:cNvPr id="4" name="Footer Placeholder 3">
             <a:extLst>
               <a:ext uri="{FF2B5EF4-FFF2-40B4-BE49-F238E27FC236}">
-                <a16:creationId xmlns:a16="http://schemas.microsoft.com/office/drawing/2014/main" xmlns="" id="{7EEC26A5-20C4-4207-866A-865C78A51D46}"/>
+                <a16:creationId xmlns:a16="http://schemas.microsoft.com/office/drawing/2014/main" id="{7EEC26A5-20C4-4207-866A-865C78A51D46}"/>
               </a:ext>
             </a:extLst>
           </p:cNvPr>
@@ -1995,7 +1995,7 @@
           <a:bodyPr/>
           <a:lstStyle/>
           <a:p>
-            <a:endParaRPr lang="en-US"/>
+            <a:endParaRPr lang="en-US" dirty="0"/>
           </a:p>
         </p:txBody>
       </p:sp>
@@ -2004,7 +2004,7 @@
           <p:cNvPr id="5" name="Slide Number Placeholder 4">
             <a:extLst>
               <a:ext uri="{FF2B5EF4-FFF2-40B4-BE49-F238E27FC236}">
-                <a16:creationId xmlns:a16="http://schemas.microsoft.com/office/drawing/2014/main" xmlns="" id="{DCF3853B-95CA-452D-8212-E3808B961AF6}"/>
+                <a16:creationId xmlns:a16="http://schemas.microsoft.com/office/drawing/2014/main" id="{DCF3853B-95CA-452D-8212-E3808B961AF6}"/>
               </a:ext>
             </a:extLst>
           </p:cNvPr>
@@ -2024,7 +2024,7 @@
               <a:rPr lang="en-US" smtClean="0"/>
               <a:t>‹#›</a:t>
             </a:fld>
-            <a:endParaRPr lang="en-US"/>
+            <a:endParaRPr lang="en-US" dirty="0"/>
           </a:p>
         </p:txBody>
       </p:sp>
@@ -2063,7 +2063,7 @@
           <p:cNvPr id="2" name="Date Placeholder 1">
             <a:extLst>
               <a:ext uri="{FF2B5EF4-FFF2-40B4-BE49-F238E27FC236}">
-                <a16:creationId xmlns:a16="http://schemas.microsoft.com/office/drawing/2014/main" xmlns="" id="{516727F3-1890-4B98-819E-D8DD1F5C87BF}"/>
+                <a16:creationId xmlns:a16="http://schemas.microsoft.com/office/drawing/2014/main" id="{516727F3-1890-4B98-819E-D8DD1F5C87BF}"/>
               </a:ext>
             </a:extLst>
           </p:cNvPr>
@@ -2081,9 +2081,9 @@
           <a:p>
             <a:fld id="{F8654557-4515-4B32-B4E2-B04B0C096466}" type="datetimeFigureOut">
               <a:rPr lang="en-US" smtClean="0"/>
-              <a:t>8/4/18</a:t>
+              <a:t>8/5/2018</a:t>
             </a:fld>
-            <a:endParaRPr lang="en-US"/>
+            <a:endParaRPr lang="en-US" dirty="0"/>
           </a:p>
         </p:txBody>
       </p:sp>
@@ -2092,7 +2092,7 @@
           <p:cNvPr id="3" name="Footer Placeholder 2">
             <a:extLst>
               <a:ext uri="{FF2B5EF4-FFF2-40B4-BE49-F238E27FC236}">
-                <a16:creationId xmlns:a16="http://schemas.microsoft.com/office/drawing/2014/main" xmlns="" id="{0D6B1711-C15E-49A8-9F15-2E74EF961292}"/>
+                <a16:creationId xmlns:a16="http://schemas.microsoft.com/office/drawing/2014/main" id="{0D6B1711-C15E-49A8-9F15-2E74EF961292}"/>
               </a:ext>
             </a:extLst>
           </p:cNvPr>
@@ -2108,7 +2108,7 @@
           <a:bodyPr/>
           <a:lstStyle/>
           <a:p>
-            <a:endParaRPr lang="en-US"/>
+            <a:endParaRPr lang="en-US" dirty="0"/>
           </a:p>
         </p:txBody>
       </p:sp>
@@ -2117,7 +2117,7 @@
           <p:cNvPr id="4" name="Slide Number Placeholder 3">
             <a:extLst>
               <a:ext uri="{FF2B5EF4-FFF2-40B4-BE49-F238E27FC236}">
-                <a16:creationId xmlns:a16="http://schemas.microsoft.com/office/drawing/2014/main" xmlns="" id="{6A8BE4A0-680A-4F4E-912D-6844C6EA5728}"/>
+                <a16:creationId xmlns:a16="http://schemas.microsoft.com/office/drawing/2014/main" id="{6A8BE4A0-680A-4F4E-912D-6844C6EA5728}"/>
               </a:ext>
             </a:extLst>
           </p:cNvPr>
@@ -2137,7 +2137,7 @@
               <a:rPr lang="en-US" smtClean="0"/>
               <a:t>‹#›</a:t>
             </a:fld>
-            <a:endParaRPr lang="en-US"/>
+            <a:endParaRPr lang="en-US" dirty="0"/>
           </a:p>
         </p:txBody>
       </p:sp>
@@ -2176,7 +2176,7 @@
           <p:cNvPr id="2" name="Title 1">
             <a:extLst>
               <a:ext uri="{FF2B5EF4-FFF2-40B4-BE49-F238E27FC236}">
-                <a16:creationId xmlns:a16="http://schemas.microsoft.com/office/drawing/2014/main" xmlns="" id="{785438FD-5625-4364-A513-E4EE5A8A8CB7}"/>
+                <a16:creationId xmlns:a16="http://schemas.microsoft.com/office/drawing/2014/main" id="{785438FD-5625-4364-A513-E4EE5A8A8CB7}"/>
               </a:ext>
             </a:extLst>
           </p:cNvPr>
@@ -2213,7 +2213,7 @@
           <p:cNvPr id="3" name="Content Placeholder 2">
             <a:extLst>
               <a:ext uri="{FF2B5EF4-FFF2-40B4-BE49-F238E27FC236}">
-                <a16:creationId xmlns:a16="http://schemas.microsoft.com/office/drawing/2014/main" xmlns="" id="{CAD76CE6-38D0-48FD-9165-7B1717EE8F79}"/>
+                <a16:creationId xmlns:a16="http://schemas.microsoft.com/office/drawing/2014/main" id="{CAD76CE6-38D0-48FD-9165-7B1717EE8F79}"/>
               </a:ext>
             </a:extLst>
           </p:cNvPr>
@@ -2303,7 +2303,7 @@
           <p:cNvPr id="4" name="Text Placeholder 3">
             <a:extLst>
               <a:ext uri="{FF2B5EF4-FFF2-40B4-BE49-F238E27FC236}">
-                <a16:creationId xmlns:a16="http://schemas.microsoft.com/office/drawing/2014/main" xmlns="" id="{8398E38D-F3D3-4698-A0FB-586141DDE1EB}"/>
+                <a16:creationId xmlns:a16="http://schemas.microsoft.com/office/drawing/2014/main" id="{8398E38D-F3D3-4698-A0FB-586141DDE1EB}"/>
               </a:ext>
             </a:extLst>
           </p:cNvPr>
@@ -2374,7 +2374,7 @@
           <p:cNvPr id="5" name="Date Placeholder 4">
             <a:extLst>
               <a:ext uri="{FF2B5EF4-FFF2-40B4-BE49-F238E27FC236}">
-                <a16:creationId xmlns:a16="http://schemas.microsoft.com/office/drawing/2014/main" xmlns="" id="{97C6E90D-5778-4E5B-9C1D-DFA9A022B719}"/>
+                <a16:creationId xmlns:a16="http://schemas.microsoft.com/office/drawing/2014/main" id="{97C6E90D-5778-4E5B-9C1D-DFA9A022B719}"/>
               </a:ext>
             </a:extLst>
           </p:cNvPr>
@@ -2392,9 +2392,9 @@
           <a:p>
             <a:fld id="{F8654557-4515-4B32-B4E2-B04B0C096466}" type="datetimeFigureOut">
               <a:rPr lang="en-US" smtClean="0"/>
-              <a:t>8/4/18</a:t>
+              <a:t>8/5/2018</a:t>
             </a:fld>
-            <a:endParaRPr lang="en-US"/>
+            <a:endParaRPr lang="en-US" dirty="0"/>
           </a:p>
         </p:txBody>
       </p:sp>
@@ -2403,7 +2403,7 @@
           <p:cNvPr id="6" name="Footer Placeholder 5">
             <a:extLst>
               <a:ext uri="{FF2B5EF4-FFF2-40B4-BE49-F238E27FC236}">
-                <a16:creationId xmlns:a16="http://schemas.microsoft.com/office/drawing/2014/main" xmlns="" id="{C3439F0F-6E1E-47EB-806C-850D90B7CDE3}"/>
+                <a16:creationId xmlns:a16="http://schemas.microsoft.com/office/drawing/2014/main" id="{C3439F0F-6E1E-47EB-806C-850D90B7CDE3}"/>
               </a:ext>
             </a:extLst>
           </p:cNvPr>
@@ -2419,7 +2419,7 @@
           <a:bodyPr/>
           <a:lstStyle/>
           <a:p>
-            <a:endParaRPr lang="en-US"/>
+            <a:endParaRPr lang="en-US" dirty="0"/>
           </a:p>
         </p:txBody>
       </p:sp>
@@ -2428,7 +2428,7 @@
           <p:cNvPr id="7" name="Slide Number Placeholder 6">
             <a:extLst>
               <a:ext uri="{FF2B5EF4-FFF2-40B4-BE49-F238E27FC236}">
-                <a16:creationId xmlns:a16="http://schemas.microsoft.com/office/drawing/2014/main" xmlns="" id="{A2CD92A9-6C37-4495-95A7-8AB995FD55E5}"/>
+                <a16:creationId xmlns:a16="http://schemas.microsoft.com/office/drawing/2014/main" id="{A2CD92A9-6C37-4495-95A7-8AB995FD55E5}"/>
               </a:ext>
             </a:extLst>
           </p:cNvPr>
@@ -2448,7 +2448,7 @@
               <a:rPr lang="en-US" smtClean="0"/>
               <a:t>‹#›</a:t>
             </a:fld>
-            <a:endParaRPr lang="en-US"/>
+            <a:endParaRPr lang="en-US" dirty="0"/>
           </a:p>
         </p:txBody>
       </p:sp>
@@ -2487,7 +2487,7 @@
           <p:cNvPr id="2" name="Title 1">
             <a:extLst>
               <a:ext uri="{FF2B5EF4-FFF2-40B4-BE49-F238E27FC236}">
-                <a16:creationId xmlns:a16="http://schemas.microsoft.com/office/drawing/2014/main" xmlns="" id="{7FEB26E2-6722-45CB-93F0-B30278BA0295}"/>
+                <a16:creationId xmlns:a16="http://schemas.microsoft.com/office/drawing/2014/main" id="{7FEB26E2-6722-45CB-93F0-B30278BA0295}"/>
               </a:ext>
             </a:extLst>
           </p:cNvPr>
@@ -2524,7 +2524,7 @@
           <p:cNvPr id="3" name="Picture Placeholder 2">
             <a:extLst>
               <a:ext uri="{FF2B5EF4-FFF2-40B4-BE49-F238E27FC236}">
-                <a16:creationId xmlns:a16="http://schemas.microsoft.com/office/drawing/2014/main" xmlns="" id="{3155F402-D397-48F9-8E9E-26489D0AD056}"/>
+                <a16:creationId xmlns:a16="http://schemas.microsoft.com/office/drawing/2014/main" id="{3155F402-D397-48F9-8E9E-26489D0AD056}"/>
               </a:ext>
             </a:extLst>
           </p:cNvPr>
@@ -2582,7 +2582,7 @@
             </a:lvl9pPr>
           </a:lstStyle>
           <a:p>
-            <a:endParaRPr lang="en-US"/>
+            <a:endParaRPr lang="en-US" dirty="0"/>
           </a:p>
         </p:txBody>
       </p:sp>
@@ -2591,7 +2591,7 @@
           <p:cNvPr id="4" name="Text Placeholder 3">
             <a:extLst>
               <a:ext uri="{FF2B5EF4-FFF2-40B4-BE49-F238E27FC236}">
-                <a16:creationId xmlns:a16="http://schemas.microsoft.com/office/drawing/2014/main" xmlns="" id="{051D74F5-BA35-4564-8F85-C6A5E17F841B}"/>
+                <a16:creationId xmlns:a16="http://schemas.microsoft.com/office/drawing/2014/main" id="{051D74F5-BA35-4564-8F85-C6A5E17F841B}"/>
               </a:ext>
             </a:extLst>
           </p:cNvPr>
@@ -2662,7 +2662,7 @@
           <p:cNvPr id="5" name="Date Placeholder 4">
             <a:extLst>
               <a:ext uri="{FF2B5EF4-FFF2-40B4-BE49-F238E27FC236}">
-                <a16:creationId xmlns:a16="http://schemas.microsoft.com/office/drawing/2014/main" xmlns="" id="{9936CD0A-F3D9-47E8-A84F-D244FC8E20AD}"/>
+                <a16:creationId xmlns:a16="http://schemas.microsoft.com/office/drawing/2014/main" id="{9936CD0A-F3D9-47E8-A84F-D244FC8E20AD}"/>
               </a:ext>
             </a:extLst>
           </p:cNvPr>
@@ -2680,9 +2680,9 @@
           <a:p>
             <a:fld id="{F8654557-4515-4B32-B4E2-B04B0C096466}" type="datetimeFigureOut">
               <a:rPr lang="en-US" smtClean="0"/>
-              <a:t>8/4/18</a:t>
+              <a:t>8/5/2018</a:t>
             </a:fld>
-            <a:endParaRPr lang="en-US"/>
+            <a:endParaRPr lang="en-US" dirty="0"/>
           </a:p>
         </p:txBody>
       </p:sp>
@@ -2691,7 +2691,7 @@
           <p:cNvPr id="6" name="Footer Placeholder 5">
             <a:extLst>
               <a:ext uri="{FF2B5EF4-FFF2-40B4-BE49-F238E27FC236}">
-                <a16:creationId xmlns:a16="http://schemas.microsoft.com/office/drawing/2014/main" xmlns="" id="{6EACE30D-9B92-4011-B8C7-CF4E71968C28}"/>
+                <a16:creationId xmlns:a16="http://schemas.microsoft.com/office/drawing/2014/main" id="{6EACE30D-9B92-4011-B8C7-CF4E71968C28}"/>
               </a:ext>
             </a:extLst>
           </p:cNvPr>
@@ -2707,7 +2707,7 @@
           <a:bodyPr/>
           <a:lstStyle/>
           <a:p>
-            <a:endParaRPr lang="en-US"/>
+            <a:endParaRPr lang="en-US" dirty="0"/>
           </a:p>
         </p:txBody>
       </p:sp>
@@ -2716,7 +2716,7 @@
           <p:cNvPr id="7" name="Slide Number Placeholder 6">
             <a:extLst>
               <a:ext uri="{FF2B5EF4-FFF2-40B4-BE49-F238E27FC236}">
-                <a16:creationId xmlns:a16="http://schemas.microsoft.com/office/drawing/2014/main" xmlns="" id="{4CAF4753-D6F7-4859-BDAE-4BEB4ED8368E}"/>
+                <a16:creationId xmlns:a16="http://schemas.microsoft.com/office/drawing/2014/main" id="{4CAF4753-D6F7-4859-BDAE-4BEB4ED8368E}"/>
               </a:ext>
             </a:extLst>
           </p:cNvPr>
@@ -2736,7 +2736,7 @@
               <a:rPr lang="en-US" smtClean="0"/>
               <a:t>‹#›</a:t>
             </a:fld>
-            <a:endParaRPr lang="en-US"/>
+            <a:endParaRPr lang="en-US" dirty="0"/>
           </a:p>
         </p:txBody>
       </p:sp>
@@ -2780,7 +2780,7 @@
           <p:cNvPr id="2" name="Title Placeholder 1">
             <a:extLst>
               <a:ext uri="{FF2B5EF4-FFF2-40B4-BE49-F238E27FC236}">
-                <a16:creationId xmlns:a16="http://schemas.microsoft.com/office/drawing/2014/main" xmlns="" id="{D9F0BD87-350C-42B0-811A-CE4BB59FCF78}"/>
+                <a16:creationId xmlns:a16="http://schemas.microsoft.com/office/drawing/2014/main" id="{D9F0BD87-350C-42B0-811A-CE4BB59FCF78}"/>
               </a:ext>
             </a:extLst>
           </p:cNvPr>
@@ -2818,7 +2818,7 @@
           <p:cNvPr id="3" name="Text Placeholder 2">
             <a:extLst>
               <a:ext uri="{FF2B5EF4-FFF2-40B4-BE49-F238E27FC236}">
-                <a16:creationId xmlns:a16="http://schemas.microsoft.com/office/drawing/2014/main" xmlns="" id="{0A92244C-AD5B-4642-946A-5AC9039809D8}"/>
+                <a16:creationId xmlns:a16="http://schemas.microsoft.com/office/drawing/2014/main" id="{0A92244C-AD5B-4642-946A-5AC9039809D8}"/>
               </a:ext>
             </a:extLst>
           </p:cNvPr>
@@ -2885,7 +2885,7 @@
           <p:cNvPr id="4" name="Date Placeholder 3">
             <a:extLst>
               <a:ext uri="{FF2B5EF4-FFF2-40B4-BE49-F238E27FC236}">
-                <a16:creationId xmlns:a16="http://schemas.microsoft.com/office/drawing/2014/main" xmlns="" id="{939706B5-D106-4620-BB13-8F92A7917ACE}"/>
+                <a16:creationId xmlns:a16="http://schemas.microsoft.com/office/drawing/2014/main" id="{939706B5-D106-4620-BB13-8F92A7917ACE}"/>
               </a:ext>
             </a:extLst>
           </p:cNvPr>
@@ -2921,9 +2921,9 @@
           <a:p>
             <a:fld id="{F8654557-4515-4B32-B4E2-B04B0C096466}" type="datetimeFigureOut">
               <a:rPr lang="en-US" smtClean="0"/>
-              <a:t>8/4/18</a:t>
+              <a:t>8/5/2018</a:t>
             </a:fld>
-            <a:endParaRPr lang="en-US"/>
+            <a:endParaRPr lang="en-US" dirty="0"/>
           </a:p>
         </p:txBody>
       </p:sp>
@@ -2932,7 +2932,7 @@
           <p:cNvPr id="5" name="Footer Placeholder 4">
             <a:extLst>
               <a:ext uri="{FF2B5EF4-FFF2-40B4-BE49-F238E27FC236}">
-                <a16:creationId xmlns:a16="http://schemas.microsoft.com/office/drawing/2014/main" xmlns="" id="{E450F03B-3D70-4464-A86D-7D4FEE4D8D13}"/>
+                <a16:creationId xmlns:a16="http://schemas.microsoft.com/office/drawing/2014/main" id="{E450F03B-3D70-4464-A86D-7D4FEE4D8D13}"/>
               </a:ext>
             </a:extLst>
           </p:cNvPr>
@@ -2966,7 +2966,7 @@
             </a:lvl1pPr>
           </a:lstStyle>
           <a:p>
-            <a:endParaRPr lang="en-US"/>
+            <a:endParaRPr lang="en-US" dirty="0"/>
           </a:p>
         </p:txBody>
       </p:sp>
@@ -2975,7 +2975,7 @@
           <p:cNvPr id="6" name="Slide Number Placeholder 5">
             <a:extLst>
               <a:ext uri="{FF2B5EF4-FFF2-40B4-BE49-F238E27FC236}">
-                <a16:creationId xmlns:a16="http://schemas.microsoft.com/office/drawing/2014/main" xmlns="" id="{E431BE67-660D-4AD3-BCCE-3E16117D1B7D}"/>
+                <a16:creationId xmlns:a16="http://schemas.microsoft.com/office/drawing/2014/main" id="{E431BE67-660D-4AD3-BCCE-3E16117D1B7D}"/>
               </a:ext>
             </a:extLst>
           </p:cNvPr>
@@ -3013,7 +3013,7 @@
               <a:rPr lang="en-US" smtClean="0"/>
               <a:t>‹#›</a:t>
             </a:fld>
-            <a:endParaRPr lang="en-US"/>
+            <a:endParaRPr lang="en-US" dirty="0"/>
           </a:p>
         </p:txBody>
       </p:sp>
@@ -3348,64 +3348,69 @@
       </p:grpSpPr>
       <p:pic>
         <p:nvPicPr>
-          <p:cNvPr id="14" name="Picture 13"/>
+          <p:cNvPr id="2" name="Picture 1">
+            <a:extLst>
+              <a:ext uri="{FF2B5EF4-FFF2-40B4-BE49-F238E27FC236}">
+                <a16:creationId xmlns:a16="http://schemas.microsoft.com/office/drawing/2014/main" id="{6CB7E502-9E92-48EB-A506-B7D490428641}"/>
+              </a:ext>
+            </a:extLst>
+          </p:cNvPr>
           <p:cNvPicPr>
             <a:picLocks noChangeAspect="1"/>
           </p:cNvPicPr>
           <p:nvPr/>
         </p:nvPicPr>
         <p:blipFill>
-          <a:blip r:embed="rId2">
-            <a:extLst>
-              <a:ext uri="{28A0092B-C50C-407E-A947-70E740481C1C}">
-                <a14:useLocalDpi xmlns:a14="http://schemas.microsoft.com/office/drawing/2010/main" val="0"/>
-              </a:ext>
-            </a:extLst>
-          </a:blip>
+          <a:blip r:embed="rId2"/>
           <a:stretch>
             <a:fillRect/>
           </a:stretch>
         </p:blipFill>
         <p:spPr>
           <a:xfrm>
-            <a:off x="5697414" y="2057400"/>
-            <a:ext cx="6494585" cy="4800600"/>
+            <a:off x="0" y="798323"/>
+            <a:ext cx="12192000" cy="5261351"/>
           </a:xfrm>
           <a:prstGeom prst="rect">
             <a:avLst/>
           </a:prstGeom>
         </p:spPr>
       </p:pic>
-      <p:pic>
-        <p:nvPicPr>
-          <p:cNvPr id="15" name="Picture 14"/>
-          <p:cNvPicPr>
-            <a:picLocks noChangeAspect="1"/>
-          </p:cNvPicPr>
+      <p:sp>
+        <p:nvSpPr>
+          <p:cNvPr id="3" name="TextBox 2">
+            <a:extLst>
+              <a:ext uri="{FF2B5EF4-FFF2-40B4-BE49-F238E27FC236}">
+                <a16:creationId xmlns:a16="http://schemas.microsoft.com/office/drawing/2014/main" id="{1D39FEFC-67F1-422B-B646-573FFE1C597A}"/>
+              </a:ext>
+            </a:extLst>
+          </p:cNvPr>
+          <p:cNvSpPr txBox="1"/>
           <p:nvPr/>
-        </p:nvPicPr>
-        <p:blipFill>
-          <a:blip r:embed="rId3">
-            <a:extLst>
-              <a:ext uri="{28A0092B-C50C-407E-A947-70E740481C1C}">
-                <a14:useLocalDpi xmlns:a14="http://schemas.microsoft.com/office/drawing/2010/main" val="0"/>
-              </a:ext>
-            </a:extLst>
-          </a:blip>
-          <a:stretch>
-            <a:fillRect/>
-          </a:stretch>
-        </p:blipFill>
+        </p:nvSpPr>
         <p:spPr>
           <a:xfrm>
-            <a:off x="355600" y="381000"/>
-            <a:ext cx="6888480" cy="1676400"/>
+            <a:off x="5715000" y="1960684"/>
+            <a:ext cx="3446584" cy="707886"/>
           </a:xfrm>
           <a:prstGeom prst="rect">
             <a:avLst/>
           </a:prstGeom>
+          <a:noFill/>
         </p:spPr>
-      </p:pic>
+        <p:txBody>
+          <a:bodyPr wrap="square" rtlCol="0">
+            <a:spAutoFit/>
+          </a:bodyPr>
+          <a:lstStyle/>
+          <a:p>
+            <a:r>
+              <a:rPr lang="en-US" sz="4000" b="1" dirty="0"/>
+              <a:t>Introduction to</a:t>
+            </a:r>
+          </a:p>
+        </p:txBody>
+      </p:sp>
     </p:spTree>
     <p:extLst>
       <p:ext uri="{BB962C8B-B14F-4D97-AF65-F5344CB8AC3E}">
@@ -3416,13 +3421,6 @@
   <p:clrMapOvr>
     <a:masterClrMapping/>
   </p:clrMapOvr>
-  <p:timing>
-    <p:tnLst>
-      <p:par>
-        <p:cTn id="1" dur="indefinite" restart="never" nodeType="tmRoot"/>
-      </p:par>
-    </p:tnLst>
-  </p:timing>
 </p:sld>
 </file>
 
@@ -3456,7 +3454,7 @@
           <p:cNvPr id="2" name="Title 1">
             <a:extLst>
               <a:ext uri="{FF2B5EF4-FFF2-40B4-BE49-F238E27FC236}">
-                <a16:creationId xmlns:a16="http://schemas.microsoft.com/office/drawing/2014/main" xmlns="" id="{9FF202C4-BE23-4422-A3B8-DE1204ED5C4A}"/>
+                <a16:creationId xmlns:a16="http://schemas.microsoft.com/office/drawing/2014/main" id="{9FF202C4-BE23-4422-A3B8-DE1204ED5C4A}"/>
               </a:ext>
             </a:extLst>
           </p:cNvPr>
@@ -3493,7 +3491,7 @@
             <a:hlinkClick r:id="rId2"/>
             <a:extLst>
               <a:ext uri="{FF2B5EF4-FFF2-40B4-BE49-F238E27FC236}">
-                <a16:creationId xmlns:a16="http://schemas.microsoft.com/office/drawing/2014/main" xmlns="" id="{0568CA61-C7E9-4CF9-BD74-3C76C71E1C02}"/>
+                <a16:creationId xmlns:a16="http://schemas.microsoft.com/office/drawing/2014/main" id="{0568CA61-C7E9-4CF9-BD74-3C76C71E1C02}"/>
               </a:ext>
             </a:extLst>
           </p:cNvPr>
@@ -3563,7 +3561,7 @@
           <p:cNvPr id="2" name="Title 1">
             <a:extLst>
               <a:ext uri="{FF2B5EF4-FFF2-40B4-BE49-F238E27FC236}">
-                <a16:creationId xmlns:a16="http://schemas.microsoft.com/office/drawing/2014/main" xmlns="" id="{9FF202C4-BE23-4422-A3B8-DE1204ED5C4A}"/>
+                <a16:creationId xmlns:a16="http://schemas.microsoft.com/office/drawing/2014/main" id="{9FF202C4-BE23-4422-A3B8-DE1204ED5C4A}"/>
               </a:ext>
             </a:extLst>
           </p:cNvPr>
@@ -3605,7 +3603,7 @@
             <a:hlinkClick r:id="rId2"/>
             <a:extLst>
               <a:ext uri="{FF2B5EF4-FFF2-40B4-BE49-F238E27FC236}">
-                <a16:creationId xmlns:a16="http://schemas.microsoft.com/office/drawing/2014/main" xmlns="" id="{ACEE5833-5DA7-4F3C-B4AF-A121D14AFCDA}"/>
+                <a16:creationId xmlns:a16="http://schemas.microsoft.com/office/drawing/2014/main" id="{ACEE5833-5DA7-4F3C-B4AF-A121D14AFCDA}"/>
               </a:ext>
             </a:extLst>
           </p:cNvPr>
@@ -3673,7 +3671,7 @@
           <p:cNvPr id="2" name="Title 1">
             <a:extLst>
               <a:ext uri="{FF2B5EF4-FFF2-40B4-BE49-F238E27FC236}">
-                <a16:creationId xmlns:a16="http://schemas.microsoft.com/office/drawing/2014/main" xmlns="" id="{9FF202C4-BE23-4422-A3B8-DE1204ED5C4A}"/>
+                <a16:creationId xmlns:a16="http://schemas.microsoft.com/office/drawing/2014/main" id="{9FF202C4-BE23-4422-A3B8-DE1204ED5C4A}"/>
               </a:ext>
             </a:extLst>
           </p:cNvPr>
@@ -3715,7 +3713,7 @@
             <a:hlinkClick r:id="rId2"/>
             <a:extLst>
               <a:ext uri="{FF2B5EF4-FFF2-40B4-BE49-F238E27FC236}">
-                <a16:creationId xmlns:a16="http://schemas.microsoft.com/office/drawing/2014/main" xmlns="" id="{24133D11-1A34-4353-A5BC-2E886CD4A15F}"/>
+                <a16:creationId xmlns:a16="http://schemas.microsoft.com/office/drawing/2014/main" id="{24133D11-1A34-4353-A5BC-2E886CD4A15F}"/>
               </a:ext>
             </a:extLst>
           </p:cNvPr>
@@ -3783,7 +3781,7 @@
           <p:cNvPr id="2" name="Title 1">
             <a:extLst>
               <a:ext uri="{FF2B5EF4-FFF2-40B4-BE49-F238E27FC236}">
-                <a16:creationId xmlns:a16="http://schemas.microsoft.com/office/drawing/2014/main" xmlns="" id="{13BA04CD-0588-4C1C-8D5E-E226AA7CC03A}"/>
+                <a16:creationId xmlns:a16="http://schemas.microsoft.com/office/drawing/2014/main" id="{13BA04CD-0588-4C1C-8D5E-E226AA7CC03A}"/>
               </a:ext>
             </a:extLst>
           </p:cNvPr>
@@ -3824,7 +3822,7 @@
           <p:cNvPr id="3" name="Content Placeholder 2">
             <a:extLst>
               <a:ext uri="{FF2B5EF4-FFF2-40B4-BE49-F238E27FC236}">
-                <a16:creationId xmlns:a16="http://schemas.microsoft.com/office/drawing/2014/main" xmlns="" id="{69E4273F-8BE8-4612-9887-5AF97B2FE045}"/>
+                <a16:creationId xmlns:a16="http://schemas.microsoft.com/office/drawing/2014/main" id="{69E4273F-8BE8-4612-9887-5AF97B2FE045}"/>
               </a:ext>
             </a:extLst>
           </p:cNvPr>
@@ -3916,7 +3914,7 @@
           <p:cNvPr id="4" name="Picture 3">
             <a:extLst>
               <a:ext uri="{FF2B5EF4-FFF2-40B4-BE49-F238E27FC236}">
-                <a16:creationId xmlns:a16="http://schemas.microsoft.com/office/drawing/2014/main" xmlns="" id="{66CE1669-2426-4361-8409-B0D0DED7A345}"/>
+                <a16:creationId xmlns:a16="http://schemas.microsoft.com/office/drawing/2014/main" id="{66CE1669-2426-4361-8409-B0D0DED7A345}"/>
               </a:ext>
             </a:extLst>
           </p:cNvPr>
@@ -3984,7 +3982,7 @@
           <p:cNvPr id="2" name="Title 1">
             <a:extLst>
               <a:ext uri="{FF2B5EF4-FFF2-40B4-BE49-F238E27FC236}">
-                <a16:creationId xmlns="" xmlns:a16="http://schemas.microsoft.com/office/drawing/2014/main" id="{28B987A4-B14A-4DD6-8294-DCF05BABC14A}"/>
+                <a16:creationId xmlns:a16="http://schemas.microsoft.com/office/drawing/2014/main" id="{28B987A4-B14A-4DD6-8294-DCF05BABC14A}"/>
               </a:ext>
             </a:extLst>
           </p:cNvPr>
@@ -4063,11 +4061,6 @@
               </a:rPr>
               <a:t>“AI is the new electricity” </a:t>
             </a:r>
-            <a:endParaRPr lang="en-US" sz="3200" b="1" dirty="0" smtClean="0">
-              <a:latin typeface="Times New Roman" charset="0"/>
-              <a:ea typeface="Times New Roman" charset="0"/>
-              <a:cs typeface="Times New Roman" charset="0"/>
-            </a:endParaRPr>
           </a:p>
           <a:p>
             <a:r>
@@ -4076,31 +4069,7 @@
                 <a:ea typeface="Times New Roman" charset="0"/>
                 <a:cs typeface="Times New Roman" charset="0"/>
               </a:rPr>
-              <a:t> </a:t>
-            </a:r>
-            <a:r>
-              <a:rPr lang="en-US" sz="3200" b="1" dirty="0" smtClean="0">
-                <a:latin typeface="Times New Roman" charset="0"/>
-                <a:ea typeface="Times New Roman" charset="0"/>
-                <a:cs typeface="Times New Roman" charset="0"/>
-              </a:rPr>
-              <a:t>                               </a:t>
-            </a:r>
-            <a:r>
-              <a:rPr lang="en-US" sz="3200" b="1" dirty="0" smtClean="0">
-                <a:latin typeface="Times New Roman" charset="0"/>
-                <a:ea typeface="Times New Roman" charset="0"/>
-                <a:cs typeface="Times New Roman" charset="0"/>
-              </a:rPr>
-              <a:t>(</a:t>
-            </a:r>
-            <a:r>
-              <a:rPr lang="en-US" sz="3200" b="1" dirty="0">
-                <a:latin typeface="Times New Roman" charset="0"/>
-                <a:ea typeface="Times New Roman" charset="0"/>
-                <a:cs typeface="Times New Roman" charset="0"/>
-              </a:rPr>
-              <a:t>Andrew Ng)</a:t>
+              <a:t>                                (Andrew Ng)</a:t>
             </a:r>
             <a:endParaRPr lang="en-US" sz="3200" dirty="0">
               <a:latin typeface="Times New Roman" charset="0"/>
@@ -4120,13 +4089,6 @@
   <p:clrMapOvr>
     <a:masterClrMapping/>
   </p:clrMapOvr>
-  <p:timing>
-    <p:tnLst>
-      <p:par>
-        <p:cTn id="1" dur="indefinite" restart="never" nodeType="tmRoot"/>
-      </p:par>
-    </p:tnLst>
-  </p:timing>
 </p:sld>
 </file>
 
@@ -4160,7 +4122,7 @@
           <p:cNvPr id="2" name="Title 1">
             <a:extLst>
               <a:ext uri="{FF2B5EF4-FFF2-40B4-BE49-F238E27FC236}">
-                <a16:creationId xmlns:a16="http://schemas.microsoft.com/office/drawing/2014/main" xmlns="" id="{63B543BC-D0CA-4FE8-B77F-FAB958C31C79}"/>
+                <a16:creationId xmlns:a16="http://schemas.microsoft.com/office/drawing/2014/main" id="{63B543BC-D0CA-4FE8-B77F-FAB958C31C79}"/>
               </a:ext>
             </a:extLst>
           </p:cNvPr>
@@ -4201,7 +4163,7 @@
           <p:cNvPr id="3" name="Content Placeholder 2">
             <a:extLst>
               <a:ext uri="{FF2B5EF4-FFF2-40B4-BE49-F238E27FC236}">
-                <a16:creationId xmlns:a16="http://schemas.microsoft.com/office/drawing/2014/main" xmlns="" id="{44A66FD1-D229-47F3-B799-6027FF1D574A}"/>
+                <a16:creationId xmlns:a16="http://schemas.microsoft.com/office/drawing/2014/main" id="{44A66FD1-D229-47F3-B799-6027FF1D574A}"/>
               </a:ext>
             </a:extLst>
           </p:cNvPr>
@@ -4269,7 +4231,7 @@
           <p:cNvPr id="7" name="Picture 6">
             <a:extLst>
               <a:ext uri="{FF2B5EF4-FFF2-40B4-BE49-F238E27FC236}">
-                <a16:creationId xmlns:a16="http://schemas.microsoft.com/office/drawing/2014/main" xmlns="" id="{CF959CB8-E9C4-4D0F-8934-0BD107E07D7D}"/>
+                <a16:creationId xmlns:a16="http://schemas.microsoft.com/office/drawing/2014/main" id="{CF959CB8-E9C4-4D0F-8934-0BD107E07D7D}"/>
               </a:ext>
             </a:extLst>
           </p:cNvPr>
@@ -4304,13 +4266,6 @@
   <p:clrMapOvr>
     <a:masterClrMapping/>
   </p:clrMapOvr>
-  <p:timing>
-    <p:tnLst>
-      <p:par>
-        <p:cTn id="1" dur="indefinite" restart="never" nodeType="tmRoot"/>
-      </p:par>
-    </p:tnLst>
-  </p:timing>
 </p:sld>
 </file>
 
@@ -4344,7 +4299,7 @@
           <p:cNvPr id="2" name="Title 1">
             <a:extLst>
               <a:ext uri="{FF2B5EF4-FFF2-40B4-BE49-F238E27FC236}">
-                <a16:creationId xmlns:a16="http://schemas.microsoft.com/office/drawing/2014/main" xmlns="" id="{9FF202C4-BE23-4422-A3B8-DE1204ED5C4A}"/>
+                <a16:creationId xmlns:a16="http://schemas.microsoft.com/office/drawing/2014/main" id="{9FF202C4-BE23-4422-A3B8-DE1204ED5C4A}"/>
               </a:ext>
             </a:extLst>
           </p:cNvPr>
@@ -4403,7 +4358,7 @@
           <p:cNvPr id="3" name="Content Placeholder 2">
             <a:extLst>
               <a:ext uri="{FF2B5EF4-FFF2-40B4-BE49-F238E27FC236}">
-                <a16:creationId xmlns:a16="http://schemas.microsoft.com/office/drawing/2014/main" xmlns="" id="{4CBEB5F4-16A0-4090-8739-F2F302D887BE}"/>
+                <a16:creationId xmlns:a16="http://schemas.microsoft.com/office/drawing/2014/main" id="{4CBEB5F4-16A0-4090-8739-F2F302D887BE}"/>
               </a:ext>
             </a:extLst>
           </p:cNvPr>
@@ -4489,7 +4444,7 @@
           <p:cNvPr id="5" name="Picture 4">
             <a:extLst>
               <a:ext uri="{FF2B5EF4-FFF2-40B4-BE49-F238E27FC236}">
-                <a16:creationId xmlns:a16="http://schemas.microsoft.com/office/drawing/2014/main" xmlns="" id="{00295358-1973-42E5-9B01-026F86831FA8}"/>
+                <a16:creationId xmlns:a16="http://schemas.microsoft.com/office/drawing/2014/main" id="{00295358-1973-42E5-9B01-026F86831FA8}"/>
               </a:ext>
             </a:extLst>
           </p:cNvPr>
@@ -4554,13 +4509,6 @@
   <p:clrMapOvr>
     <a:masterClrMapping/>
   </p:clrMapOvr>
-  <p:timing>
-    <p:tnLst>
-      <p:par>
-        <p:cTn id="1" dur="indefinite" restart="never" nodeType="tmRoot"/>
-      </p:par>
-    </p:tnLst>
-  </p:timing>
 </p:sld>
 </file>
 
@@ -4594,7 +4542,7 @@
           <p:cNvPr id="2" name="Title 1">
             <a:extLst>
               <a:ext uri="{FF2B5EF4-FFF2-40B4-BE49-F238E27FC236}">
-                <a16:creationId xmlns:a16="http://schemas.microsoft.com/office/drawing/2014/main" xmlns="" id="{9FF202C4-BE23-4422-A3B8-DE1204ED5C4A}"/>
+                <a16:creationId xmlns:a16="http://schemas.microsoft.com/office/drawing/2014/main" id="{9FF202C4-BE23-4422-A3B8-DE1204ED5C4A}"/>
               </a:ext>
             </a:extLst>
           </p:cNvPr>
@@ -4655,7 +4603,7 @@
           <p:cNvPr id="3" name="Content Placeholder 2">
             <a:extLst>
               <a:ext uri="{FF2B5EF4-FFF2-40B4-BE49-F238E27FC236}">
-                <a16:creationId xmlns:a16="http://schemas.microsoft.com/office/drawing/2014/main" xmlns="" id="{4CBEB5F4-16A0-4090-8739-F2F302D887BE}"/>
+                <a16:creationId xmlns:a16="http://schemas.microsoft.com/office/drawing/2014/main" id="{4CBEB5F4-16A0-4090-8739-F2F302D887BE}"/>
               </a:ext>
             </a:extLst>
           </p:cNvPr>
@@ -4741,7 +4689,7 @@
             </a:endParaRPr>
           </a:p>
           <a:p>
-            <a:endParaRPr lang="en-US" dirty="0" smtClean="0">
+            <a:endParaRPr lang="en-US" dirty="0">
               <a:solidFill>
                 <a:schemeClr val="bg1"/>
               </a:solidFill>
@@ -4790,7 +4738,7 @@
           <p:cNvPr id="4" name="Picture 3">
             <a:extLst>
               <a:ext uri="{FF2B5EF4-FFF2-40B4-BE49-F238E27FC236}">
-                <a16:creationId xmlns:a16="http://schemas.microsoft.com/office/drawing/2014/main" xmlns="" id="{E10F11A3-4F58-4BAC-AE27-99C25FE2F08A}"/>
+                <a16:creationId xmlns:a16="http://schemas.microsoft.com/office/drawing/2014/main" id="{E10F11A3-4F58-4BAC-AE27-99C25FE2F08A}"/>
               </a:ext>
             </a:extLst>
           </p:cNvPr>
@@ -4858,7 +4806,7 @@
           <p:cNvPr id="2" name="Title 1">
             <a:extLst>
               <a:ext uri="{FF2B5EF4-FFF2-40B4-BE49-F238E27FC236}">
-                <a16:creationId xmlns:a16="http://schemas.microsoft.com/office/drawing/2014/main" xmlns="" id="{9FF202C4-BE23-4422-A3B8-DE1204ED5C4A}"/>
+                <a16:creationId xmlns:a16="http://schemas.microsoft.com/office/drawing/2014/main" id="{9FF202C4-BE23-4422-A3B8-DE1204ED5C4A}"/>
               </a:ext>
             </a:extLst>
           </p:cNvPr>
@@ -4894,7 +4842,7 @@
           <p:cNvPr id="3" name="Content Placeholder 2">
             <a:extLst>
               <a:ext uri="{FF2B5EF4-FFF2-40B4-BE49-F238E27FC236}">
-                <a16:creationId xmlns:a16="http://schemas.microsoft.com/office/drawing/2014/main" xmlns="" id="{4CBEB5F4-16A0-4090-8739-F2F302D887BE}"/>
+                <a16:creationId xmlns:a16="http://schemas.microsoft.com/office/drawing/2014/main" id="{4CBEB5F4-16A0-4090-8739-F2F302D887BE}"/>
               </a:ext>
             </a:extLst>
           </p:cNvPr>
@@ -4930,7 +4878,7 @@
             <a:hlinkClick r:id="rId2"/>
             <a:extLst>
               <a:ext uri="{FF2B5EF4-FFF2-40B4-BE49-F238E27FC236}">
-                <a16:creationId xmlns:a16="http://schemas.microsoft.com/office/drawing/2014/main" xmlns="" id="{5F177968-7E37-454C-A56D-A2EEBB1EA0FA}"/>
+                <a16:creationId xmlns:a16="http://schemas.microsoft.com/office/drawing/2014/main" id="{5F177968-7E37-454C-A56D-A2EEBB1EA0FA}"/>
               </a:ext>
             </a:extLst>
           </p:cNvPr>
@@ -4960,7 +4908,7 @@
           <p:cNvPr id="5" name="Picture 4">
             <a:extLst>
               <a:ext uri="{FF2B5EF4-FFF2-40B4-BE49-F238E27FC236}">
-                <a16:creationId xmlns:a16="http://schemas.microsoft.com/office/drawing/2014/main" xmlns="" id="{73FEDE46-8FD5-4295-B6E8-34FD15B28208}"/>
+                <a16:creationId xmlns:a16="http://schemas.microsoft.com/office/drawing/2014/main" id="{73FEDE46-8FD5-4295-B6E8-34FD15B28208}"/>
               </a:ext>
             </a:extLst>
           </p:cNvPr>
@@ -5028,7 +4976,7 @@
           <p:cNvPr id="2" name="Title 1">
             <a:extLst>
               <a:ext uri="{FF2B5EF4-FFF2-40B4-BE49-F238E27FC236}">
-                <a16:creationId xmlns:a16="http://schemas.microsoft.com/office/drawing/2014/main" xmlns="" id="{9FF202C4-BE23-4422-A3B8-DE1204ED5C4A}"/>
+                <a16:creationId xmlns:a16="http://schemas.microsoft.com/office/drawing/2014/main" id="{9FF202C4-BE23-4422-A3B8-DE1204ED5C4A}"/>
               </a:ext>
             </a:extLst>
           </p:cNvPr>
@@ -5069,7 +5017,7 @@
           <p:cNvPr id="3" name="Content Placeholder 2">
             <a:extLst>
               <a:ext uri="{FF2B5EF4-FFF2-40B4-BE49-F238E27FC236}">
-                <a16:creationId xmlns:a16="http://schemas.microsoft.com/office/drawing/2014/main" xmlns="" id="{4CBEB5F4-16A0-4090-8739-F2F302D887BE}"/>
+                <a16:creationId xmlns:a16="http://schemas.microsoft.com/office/drawing/2014/main" id="{4CBEB5F4-16A0-4090-8739-F2F302D887BE}"/>
               </a:ext>
             </a:extLst>
           </p:cNvPr>
@@ -5104,51 +5052,7 @@
                 <a:ea typeface="Times New Roman" charset="0"/>
                 <a:cs typeface="Times New Roman" charset="0"/>
               </a:rPr>
-              <a:t>Supervised Deep Learning: </a:t>
-            </a:r>
-            <a:r>
-              <a:rPr lang="en-US" dirty="0" smtClean="0">
-                <a:solidFill>
-                  <a:schemeClr val="bg1"/>
-                </a:solidFill>
-                <a:latin typeface="Times New Roman" charset="0"/>
-                <a:ea typeface="Times New Roman" charset="0"/>
-                <a:cs typeface="Times New Roman" charset="0"/>
-              </a:rPr>
-              <a:t>Fully </a:t>
-            </a:r>
-            <a:r>
-              <a:rPr lang="en-US" dirty="0" smtClean="0">
-                <a:solidFill>
-                  <a:schemeClr val="bg1"/>
-                </a:solidFill>
-                <a:latin typeface="Times New Roman" charset="0"/>
-                <a:ea typeface="Times New Roman" charset="0"/>
-                <a:cs typeface="Times New Roman" charset="0"/>
-              </a:rPr>
-              <a:t>Connected </a:t>
-            </a:r>
-            <a:r>
-              <a:rPr lang="en-US" dirty="0" smtClean="0">
-                <a:solidFill>
-                  <a:schemeClr val="bg1"/>
-                </a:solidFill>
-                <a:latin typeface="Times New Roman" charset="0"/>
-                <a:ea typeface="Times New Roman" charset="0"/>
-                <a:cs typeface="Times New Roman" charset="0"/>
-              </a:rPr>
-              <a:t>Neural </a:t>
-            </a:r>
-            <a:r>
-              <a:rPr lang="en-US" dirty="0">
-                <a:solidFill>
-                  <a:schemeClr val="bg1"/>
-                </a:solidFill>
-                <a:latin typeface="Times New Roman" charset="0"/>
-                <a:ea typeface="Times New Roman" charset="0"/>
-                <a:cs typeface="Times New Roman" charset="0"/>
-              </a:rPr>
-              <a:t>Networks</a:t>
+              <a:t>Supervised Deep Learning: Fully Connected Neural Networks</a:t>
             </a:r>
           </a:p>
         </p:txBody>
@@ -5158,7 +5062,7 @@
           <p:cNvPr id="5" name="Picture 4">
             <a:extLst>
               <a:ext uri="{FF2B5EF4-FFF2-40B4-BE49-F238E27FC236}">
-                <a16:creationId xmlns:a16="http://schemas.microsoft.com/office/drawing/2014/main" xmlns="" id="{548D2FC7-6246-47F1-AC44-ACAB36C834B4}"/>
+                <a16:creationId xmlns:a16="http://schemas.microsoft.com/office/drawing/2014/main" id="{548D2FC7-6246-47F1-AC44-ACAB36C834B4}"/>
               </a:ext>
             </a:extLst>
           </p:cNvPr>
@@ -5226,7 +5130,7 @@
           <p:cNvPr id="2" name="Title 1">
             <a:extLst>
               <a:ext uri="{FF2B5EF4-FFF2-40B4-BE49-F238E27FC236}">
-                <a16:creationId xmlns:a16="http://schemas.microsoft.com/office/drawing/2014/main" xmlns="" id="{9FF202C4-BE23-4422-A3B8-DE1204ED5C4A}"/>
+                <a16:creationId xmlns:a16="http://schemas.microsoft.com/office/drawing/2014/main" id="{9FF202C4-BE23-4422-A3B8-DE1204ED5C4A}"/>
               </a:ext>
             </a:extLst>
           </p:cNvPr>
@@ -5259,14 +5163,6 @@
               </a:rPr>
               <a:t>Convolutional Neural Network</a:t>
             </a:r>
-            <a:endParaRPr lang="en-US" b="1" dirty="0">
-              <a:solidFill>
-                <a:schemeClr val="bg1"/>
-              </a:solidFill>
-              <a:latin typeface="Times New Roman" charset="0"/>
-              <a:ea typeface="Times New Roman" charset="0"/>
-              <a:cs typeface="Times New Roman" charset="0"/>
-            </a:endParaRPr>
           </a:p>
         </p:txBody>
       </p:sp>
@@ -5275,7 +5171,7 @@
           <p:cNvPr id="3" name="Content Placeholder 2">
             <a:extLst>
               <a:ext uri="{FF2B5EF4-FFF2-40B4-BE49-F238E27FC236}">
-                <a16:creationId xmlns:a16="http://schemas.microsoft.com/office/drawing/2014/main" xmlns="" id="{4CBEB5F4-16A0-4090-8739-F2F302D887BE}"/>
+                <a16:creationId xmlns:a16="http://schemas.microsoft.com/office/drawing/2014/main" id="{4CBEB5F4-16A0-4090-8739-F2F302D887BE}"/>
               </a:ext>
             </a:extLst>
           </p:cNvPr>
@@ -5308,27 +5204,8 @@
                 <a:ea typeface="Times New Roman" charset="0"/>
                 <a:cs typeface="Times New Roman" charset="0"/>
               </a:rPr>
-              <a:t>Supervised Deep Learning: </a:t>
-            </a:r>
-            <a:r>
-              <a:rPr lang="en-US" dirty="0" smtClean="0">
-                <a:solidFill>
-                  <a:schemeClr val="bg1"/>
-                </a:solidFill>
-                <a:latin typeface="Times New Roman" charset="0"/>
-                <a:ea typeface="Times New Roman" charset="0"/>
-                <a:cs typeface="Times New Roman" charset="0"/>
-              </a:rPr>
-              <a:t>Image Processing </a:t>
-            </a:r>
-            <a:endParaRPr lang="en-US" dirty="0">
-              <a:solidFill>
-                <a:schemeClr val="bg1"/>
-              </a:solidFill>
-              <a:latin typeface="Times New Roman" charset="0"/>
-              <a:ea typeface="Times New Roman" charset="0"/>
-              <a:cs typeface="Times New Roman" charset="0"/>
-            </a:endParaRPr>
+              <a:t>Supervised Deep Learning: Image Processing </a:t>
+            </a:r>
           </a:p>
         </p:txBody>
       </p:sp>
@@ -5405,7 +5282,7 @@
           <p:cNvPr id="2" name="Title 1">
             <a:extLst>
               <a:ext uri="{FF2B5EF4-FFF2-40B4-BE49-F238E27FC236}">
-                <a16:creationId xmlns:a16="http://schemas.microsoft.com/office/drawing/2014/main" xmlns="" id="{9FF202C4-BE23-4422-A3B8-DE1204ED5C4A}"/>
+                <a16:creationId xmlns:a16="http://schemas.microsoft.com/office/drawing/2014/main" id="{9FF202C4-BE23-4422-A3B8-DE1204ED5C4A}"/>
               </a:ext>
             </a:extLst>
           </p:cNvPr>
@@ -5427,17 +5304,6 @@
           <a:lstStyle/>
           <a:p>
             <a:pPr algn="ctr"/>
-            <a:r>
-              <a:rPr lang="en-US" b="1" dirty="0" smtClean="0">
-                <a:solidFill>
-                  <a:schemeClr val="bg1"/>
-                </a:solidFill>
-                <a:latin typeface="Times New Roman" charset="0"/>
-                <a:ea typeface="Times New Roman" charset="0"/>
-                <a:cs typeface="Times New Roman" charset="0"/>
-              </a:rPr>
-              <a:t>Recurrent </a:t>
-            </a:r>
             <a:r>
               <a:rPr lang="en-US" b="1" dirty="0">
                 <a:solidFill>
@@ -5447,16 +5313,8 @@
                 <a:ea typeface="Times New Roman" charset="0"/>
                 <a:cs typeface="Times New Roman" charset="0"/>
               </a:rPr>
-              <a:t>Neural Network</a:t>
-            </a:r>
-            <a:endParaRPr lang="en-US" b="1" dirty="0">
-              <a:solidFill>
-                <a:schemeClr val="bg1"/>
-              </a:solidFill>
-              <a:latin typeface="Times New Roman" charset="0"/>
-              <a:ea typeface="Times New Roman" charset="0"/>
-              <a:cs typeface="Times New Roman" charset="0"/>
-            </a:endParaRPr>
+              <a:t>Recurrent Neural Network</a:t>
+            </a:r>
           </a:p>
         </p:txBody>
       </p:sp>
@@ -5465,7 +5323,7 @@
           <p:cNvPr id="3" name="Content Placeholder 2">
             <a:extLst>
               <a:ext uri="{FF2B5EF4-FFF2-40B4-BE49-F238E27FC236}">
-                <a16:creationId xmlns:a16="http://schemas.microsoft.com/office/drawing/2014/main" xmlns="" id="{4CBEB5F4-16A0-4090-8739-F2F302D887BE}"/>
+                <a16:creationId xmlns:a16="http://schemas.microsoft.com/office/drawing/2014/main" id="{4CBEB5F4-16A0-4090-8739-F2F302D887BE}"/>
               </a:ext>
             </a:extLst>
           </p:cNvPr>
@@ -5498,27 +5356,8 @@
                 <a:ea typeface="Times New Roman" charset="0"/>
                 <a:cs typeface="Times New Roman" charset="0"/>
               </a:rPr>
-              <a:t>Supervised Deep Learning: </a:t>
-            </a:r>
-            <a:r>
-              <a:rPr lang="en-US" dirty="0" smtClean="0">
-                <a:solidFill>
-                  <a:schemeClr val="bg1"/>
-                </a:solidFill>
-                <a:latin typeface="Times New Roman" charset="0"/>
-                <a:ea typeface="Times New Roman" charset="0"/>
-                <a:cs typeface="Times New Roman" charset="0"/>
-              </a:rPr>
-              <a:t>Image Processing </a:t>
-            </a:r>
-            <a:endParaRPr lang="en-US" dirty="0">
-              <a:solidFill>
-                <a:schemeClr val="bg1"/>
-              </a:solidFill>
-              <a:latin typeface="Times New Roman" charset="0"/>
-              <a:ea typeface="Times New Roman" charset="0"/>
-              <a:cs typeface="Times New Roman" charset="0"/>
-            </a:endParaRPr>
+              <a:t>Supervised Deep Learning: Image Processing </a:t>
+            </a:r>
           </a:p>
         </p:txBody>
       </p:sp>

</xml_diff>